<commit_message>
Created combined PV loop plots
</commit_message>
<xml_diff>
--- a/Steps.pptx
+++ b/Steps.pptx
@@ -306,7 +306,7 @@
           <a:p>
             <a:fld id="{802292CB-329F-4C9E-AFE5-BAC6CB09A498}" type="datetimeFigureOut">
               <a:rPr lang="en-NZ" smtClean="0"/>
-              <a:t>9/03/2018</a:t>
+              <a:t>9/04/2018</a:t>
             </a:fld>
             <a:endParaRPr lang="en-NZ"/>
           </a:p>
@@ -476,7 +476,7 @@
           <a:p>
             <a:fld id="{802292CB-329F-4C9E-AFE5-BAC6CB09A498}" type="datetimeFigureOut">
               <a:rPr lang="en-NZ" smtClean="0"/>
-              <a:t>9/03/2018</a:t>
+              <a:t>9/04/2018</a:t>
             </a:fld>
             <a:endParaRPr lang="en-NZ"/>
           </a:p>
@@ -656,7 +656,7 @@
           <a:p>
             <a:fld id="{802292CB-329F-4C9E-AFE5-BAC6CB09A498}" type="datetimeFigureOut">
               <a:rPr lang="en-NZ" smtClean="0"/>
-              <a:t>9/03/2018</a:t>
+              <a:t>9/04/2018</a:t>
             </a:fld>
             <a:endParaRPr lang="en-NZ"/>
           </a:p>
@@ -826,7 +826,7 @@
           <a:p>
             <a:fld id="{802292CB-329F-4C9E-AFE5-BAC6CB09A498}" type="datetimeFigureOut">
               <a:rPr lang="en-NZ" smtClean="0"/>
-              <a:t>9/03/2018</a:t>
+              <a:t>9/04/2018</a:t>
             </a:fld>
             <a:endParaRPr lang="en-NZ"/>
           </a:p>
@@ -1072,7 +1072,7 @@
           <a:p>
             <a:fld id="{802292CB-329F-4C9E-AFE5-BAC6CB09A498}" type="datetimeFigureOut">
               <a:rPr lang="en-NZ" smtClean="0"/>
-              <a:t>9/03/2018</a:t>
+              <a:t>9/04/2018</a:t>
             </a:fld>
             <a:endParaRPr lang="en-NZ"/>
           </a:p>
@@ -1360,7 +1360,7 @@
           <a:p>
             <a:fld id="{802292CB-329F-4C9E-AFE5-BAC6CB09A498}" type="datetimeFigureOut">
               <a:rPr lang="en-NZ" smtClean="0"/>
-              <a:t>9/03/2018</a:t>
+              <a:t>9/04/2018</a:t>
             </a:fld>
             <a:endParaRPr lang="en-NZ"/>
           </a:p>
@@ -1782,7 +1782,7 @@
           <a:p>
             <a:fld id="{802292CB-329F-4C9E-AFE5-BAC6CB09A498}" type="datetimeFigureOut">
               <a:rPr lang="en-NZ" smtClean="0"/>
-              <a:t>9/03/2018</a:t>
+              <a:t>9/04/2018</a:t>
             </a:fld>
             <a:endParaRPr lang="en-NZ"/>
           </a:p>
@@ -1900,7 +1900,7 @@
           <a:p>
             <a:fld id="{802292CB-329F-4C9E-AFE5-BAC6CB09A498}" type="datetimeFigureOut">
               <a:rPr lang="en-NZ" smtClean="0"/>
-              <a:t>9/03/2018</a:t>
+              <a:t>9/04/2018</a:t>
             </a:fld>
             <a:endParaRPr lang="en-NZ"/>
           </a:p>
@@ -1995,7 +1995,7 @@
           <a:p>
             <a:fld id="{802292CB-329F-4C9E-AFE5-BAC6CB09A498}" type="datetimeFigureOut">
               <a:rPr lang="en-NZ" smtClean="0"/>
-              <a:t>9/03/2018</a:t>
+              <a:t>9/04/2018</a:t>
             </a:fld>
             <a:endParaRPr lang="en-NZ"/>
           </a:p>
@@ -2272,7 +2272,7 @@
           <a:p>
             <a:fld id="{802292CB-329F-4C9E-AFE5-BAC6CB09A498}" type="datetimeFigureOut">
               <a:rPr lang="en-NZ" smtClean="0"/>
-              <a:t>9/03/2018</a:t>
+              <a:t>9/04/2018</a:t>
             </a:fld>
             <a:endParaRPr lang="en-NZ"/>
           </a:p>
@@ -2529,7 +2529,7 @@
           <a:p>
             <a:fld id="{802292CB-329F-4C9E-AFE5-BAC6CB09A498}" type="datetimeFigureOut">
               <a:rPr lang="en-NZ" smtClean="0"/>
-              <a:t>9/03/2018</a:t>
+              <a:t>9/04/2018</a:t>
             </a:fld>
             <a:endParaRPr lang="en-NZ"/>
           </a:p>
@@ -2742,7 +2742,7 @@
           <a:p>
             <a:fld id="{802292CB-329F-4C9E-AFE5-BAC6CB09A498}" type="datetimeFigureOut">
               <a:rPr lang="en-NZ" smtClean="0"/>
-              <a:t>9/03/2018</a:t>
+              <a:t>9/04/2018</a:t>
             </a:fld>
             <a:endParaRPr lang="en-NZ"/>
           </a:p>
@@ -4122,7 +4122,11 @@
             <a:pPr algn="ctr"/>
             <a:r>
               <a:rPr lang="en-NZ" sz="1000" dirty="0" smtClean="0"/>
-              <a:t>Detect cardiac events:</a:t>
+              <a:t>*Detect </a:t>
+            </a:r>
+            <a:r>
+              <a:rPr lang="en-NZ" sz="1000" dirty="0" smtClean="0"/>
+              <a:t>cardiac events:</a:t>
             </a:r>
           </a:p>
           <a:p>
@@ -4902,7 +4906,6 @@
                 <a:rPr lang="en-NZ" sz="1000" dirty="0" smtClean="0"/>
                 <a:t> LVP cycles?</a:t>
               </a:r>
-              <a:endParaRPr lang="en-NZ" sz="1000" dirty="0" smtClean="0"/>
             </a:p>
           </p:txBody>
         </p:sp>
@@ -4969,7 +4972,6 @@
                   <a:rPr lang="en-NZ" sz="1000" dirty="0" smtClean="0"/>
                   <a:t> AOP cycles?</a:t>
                 </a:r>
-                <a:endParaRPr lang="en-NZ" sz="1000" dirty="0" smtClean="0"/>
               </a:p>
             </p:txBody>
           </p:sp>
@@ -5133,15 +5135,7 @@
                 <a:pPr algn="ctr"/>
                 <a:r>
                   <a:rPr lang="en-NZ" sz="1000" dirty="0" smtClean="0"/>
-                  <a:t>UI</a:t>
-                </a:r>
-                <a:r>
-                  <a:rPr lang="en-NZ" sz="1000" dirty="0" smtClean="0"/>
-                  <a:t>: </a:t>
-                </a:r>
-                <a:r>
-                  <a:rPr lang="en-NZ" sz="1000" dirty="0" smtClean="0"/>
-                  <a:t>Identify </a:t>
+                  <a:t>UI: Identify </a:t>
                 </a:r>
                 <a:r>
                   <a:rPr lang="en-NZ" sz="1000" dirty="0" err="1" smtClean="0"/>
@@ -5151,7 +5145,6 @@
                   <a:rPr lang="en-NZ" sz="1000" dirty="0" smtClean="0"/>
                   <a:t> notch in AOP</a:t>
                 </a:r>
-                <a:endParaRPr lang="en-NZ" sz="1000" dirty="0" smtClean="0"/>
               </a:p>
             </p:txBody>
           </p:sp>
@@ -5269,7 +5262,6 @@
                   <a:rPr lang="en-NZ" sz="1000" dirty="0" smtClean="0"/>
                   <a:t> = 0</a:t>
                 </a:r>
-                <a:endParaRPr lang="en-NZ" sz="1000" dirty="0" smtClean="0"/>
               </a:p>
             </p:txBody>
           </p:sp>
@@ -5350,7 +5342,6 @@
                 <a:rPr lang="en-NZ" sz="1000" dirty="0" smtClean="0"/>
                 <a:t> = 0</a:t>
               </a:r>
-              <a:endParaRPr lang="en-NZ" sz="1000" dirty="0" smtClean="0"/>
             </a:p>
           </p:txBody>
         </p:sp>
@@ -5477,9 +5468,7 @@
             <a:prstGeom prst="rect">
               <a:avLst/>
             </a:prstGeom>
-            <a:solidFill>
-              <a:schemeClr val="bg1"/>
-            </a:solidFill>
+            <a:noFill/>
             <a:ln>
               <a:noFill/>
             </a:ln>
@@ -5535,7 +5524,6 @@
                 <a:rPr lang="en-NZ" sz="1000" dirty="0" smtClean="0"/>
                 <a:t>Identify ED</a:t>
               </a:r>
-              <a:endParaRPr lang="en-NZ" sz="1000" dirty="0" smtClean="0"/>
             </a:p>
           </p:txBody>
         </p:sp>
@@ -5609,7 +5597,6 @@
                 <a:rPr lang="en-NZ" sz="1000" dirty="0" smtClean="0"/>
                 <a:t>Identify DS</a:t>
               </a:r>
-              <a:endParaRPr lang="en-NZ" sz="1000" dirty="0" smtClean="0"/>
             </a:p>
           </p:txBody>
         </p:sp>
@@ -5957,6 +5944,36 @@
           </a:prstGeom>
         </p:spPr>
       </p:pic>
+      <p:sp>
+        <p:nvSpPr>
+          <p:cNvPr id="2" name="TextBox 1"/>
+          <p:cNvSpPr txBox="1"/>
+          <p:nvPr/>
+        </p:nvSpPr>
+        <p:spPr>
+          <a:xfrm>
+            <a:off x="10883" y="116632"/>
+            <a:ext cx="432048" cy="707886"/>
+          </a:xfrm>
+          <a:prstGeom prst="rect">
+            <a:avLst/>
+          </a:prstGeom>
+          <a:noFill/>
+        </p:spPr>
+        <p:txBody>
+          <a:bodyPr wrap="square" rtlCol="0">
+            <a:spAutoFit/>
+          </a:bodyPr>
+          <a:lstStyle/>
+          <a:p>
+            <a:r>
+              <a:rPr lang="en-NZ" sz="4000" dirty="0" smtClean="0"/>
+              <a:t>*</a:t>
+            </a:r>
+            <a:endParaRPr lang="en-NZ" sz="4000" dirty="0"/>
+          </a:p>
+        </p:txBody>
+      </p:sp>
     </p:spTree>
     <p:extLst>
       <p:ext uri="{BB962C8B-B14F-4D97-AF65-F5344CB8AC3E}">

</xml_diff>